<commit_message>
fix: 🐛 some minor problems has been resolved
</commit_message>
<xml_diff>
--- a/10 - Golang 4.pptx
+++ b/10 - Golang 4.pptx
@@ -221,7 +221,7 @@
           <a:p>
             <a:fld id="{BE188B3E-875C-4BAA-89E8-016C94E3F684}" type="datetimeFigureOut">
               <a:rPr lang="fa-IR" smtClean="0"/>
-              <a:t>06/03/1442</a:t>
+              <a:t>20/03/1442</a:t>
             </a:fld>
             <a:endParaRPr lang="fa-IR"/>
           </a:p>
@@ -706,6 +706,1035 @@
     <p:extLst>
       <p:ext uri="{BB962C8B-B14F-4D97-AF65-F5344CB8AC3E}">
         <p14:creationId xmlns:p14="http://schemas.microsoft.com/office/powerpoint/2010/main" val="563433074"/>
+      </p:ext>
+    </p:extLst>
+  </p:cSld>
+  <p:clrMapOvr>
+    <a:masterClrMapping/>
+  </p:clrMapOvr>
+</p:notes>
+</file>
+
+<file path=ppt/notesSlides/notesSlide11.xml><?xml version="1.0" encoding="utf-8"?>
+<p:notes xmlns:a="http://schemas.openxmlformats.org/drawingml/2006/main" xmlns:r="http://schemas.openxmlformats.org/officeDocument/2006/relationships" xmlns:p="http://schemas.openxmlformats.org/presentationml/2006/main">
+  <p:cSld>
+    <p:spTree>
+      <p:nvGrpSpPr>
+        <p:cNvPr id="1" name=""/>
+        <p:cNvGrpSpPr/>
+        <p:nvPr/>
+      </p:nvGrpSpPr>
+      <p:grpSpPr>
+        <a:xfrm>
+          <a:off x="0" y="0"/>
+          <a:ext cx="0" cy="0"/>
+          <a:chOff x="0" y="0"/>
+          <a:chExt cx="0" cy="0"/>
+        </a:xfrm>
+      </p:grpSpPr>
+      <p:sp>
+        <p:nvSpPr>
+          <p:cNvPr id="2" name="Slide Image Placeholder 1"/>
+          <p:cNvSpPr>
+            <a:spLocks noGrp="1" noRot="1" noChangeAspect="1"/>
+          </p:cNvSpPr>
+          <p:nvPr>
+            <p:ph type="sldImg"/>
+          </p:nvPr>
+        </p:nvSpPr>
+        <p:spPr/>
+      </p:sp>
+      <p:sp>
+        <p:nvSpPr>
+          <p:cNvPr id="3" name="Notes Placeholder 2"/>
+          <p:cNvSpPr>
+            <a:spLocks noGrp="1"/>
+          </p:cNvSpPr>
+          <p:nvPr>
+            <p:ph type="body" idx="1"/>
+          </p:nvPr>
+        </p:nvSpPr>
+        <p:spPr/>
+        <p:txBody>
+          <a:bodyPr/>
+          <a:lstStyle/>
+          <a:p>
+            <a:pPr marL="171450" indent="-171450">
+              <a:buFont typeface="Arial" panose="020B0604020202020204" pitchFamily="34" charset="0"/>
+              <a:buChar char="•"/>
+            </a:pPr>
+            <a:r>
+              <a:rPr lang="en-US" dirty="0"/>
+              <a:t>We have green threads in </a:t>
+            </a:r>
+            <a:r>
+              <a:rPr lang="en-US" dirty="0" err="1"/>
+              <a:t>golang</a:t>
+            </a:r>
+            <a:r>
+              <a:rPr lang="en-US" dirty="0"/>
+              <a:t> (and erlang)</a:t>
+            </a:r>
+          </a:p>
+          <a:p>
+            <a:pPr marL="628650" lvl="1" indent="-171450">
+              <a:buFont typeface="Arial" panose="020B0604020202020204" pitchFamily="34" charset="0"/>
+              <a:buChar char="•"/>
+            </a:pPr>
+            <a:r>
+              <a:rPr lang="en-US" dirty="0"/>
+              <a:t>Creating and destroying threads are so cheap in </a:t>
+            </a:r>
+            <a:r>
+              <a:rPr lang="en-US" dirty="0" err="1"/>
+              <a:t>golang</a:t>
+            </a:r>
+            <a:endParaRPr lang="en-US" dirty="0"/>
+          </a:p>
+          <a:p>
+            <a:pPr marL="628650" lvl="1" indent="-171450">
+              <a:buFont typeface="Arial" panose="020B0604020202020204" pitchFamily="34" charset="0"/>
+              <a:buChar char="•"/>
+            </a:pPr>
+            <a:r>
+              <a:rPr lang="en-US" dirty="0"/>
+              <a:t>Other language are relying on the </a:t>
+            </a:r>
+            <a:r>
+              <a:rPr lang="en-US" dirty="0" err="1"/>
+              <a:t>os</a:t>
+            </a:r>
+            <a:r>
+              <a:rPr lang="en-US" dirty="0"/>
+              <a:t> threads (that have 1 mb overhead), so it is impossible to have one thousand thread in other languages, but in </a:t>
+            </a:r>
+            <a:r>
+              <a:rPr lang="en-US" dirty="0" err="1"/>
+              <a:t>golang</a:t>
+            </a:r>
+            <a:r>
+              <a:rPr lang="en-US" dirty="0"/>
+              <a:t> it is possible.</a:t>
+            </a:r>
+          </a:p>
+          <a:p>
+            <a:pPr marL="628650" lvl="1" indent="-171450">
+              <a:buFont typeface="Arial" panose="020B0604020202020204" pitchFamily="34" charset="0"/>
+              <a:buChar char="•"/>
+            </a:pPr>
+            <a:r>
+              <a:rPr lang="en-US" dirty="0"/>
+              <a:t>Green threads = some nice lightweight abstraction of thread that scheduled by </a:t>
+            </a:r>
+            <a:r>
+              <a:rPr lang="en-US" dirty="0" err="1"/>
+              <a:t>golang</a:t>
+            </a:r>
+            <a:r>
+              <a:rPr lang="en-US" dirty="0"/>
+              <a:t>.</a:t>
+            </a:r>
+          </a:p>
+          <a:p>
+            <a:pPr marL="1085850" lvl="2" indent="-171450">
+              <a:buFont typeface="Arial" panose="020B0604020202020204" pitchFamily="34" charset="0"/>
+              <a:buChar char="•"/>
+            </a:pPr>
+            <a:r>
+              <a:rPr lang="en-US" dirty="0"/>
+              <a:t>https://en.wikipedia.org/wiki/Green_threads</a:t>
+            </a:r>
+          </a:p>
+          <a:p>
+            <a:pPr marL="1085850" lvl="2" indent="-171450">
+              <a:buFont typeface="Arial" panose="020B0604020202020204" pitchFamily="34" charset="0"/>
+              <a:buChar char="•"/>
+            </a:pPr>
+            <a:endParaRPr lang="en-US" dirty="0"/>
+          </a:p>
+          <a:p>
+            <a:pPr algn="l"/>
+            <a:r>
+              <a:rPr lang="en-US" b="0" i="0" dirty="0">
+                <a:solidFill>
+                  <a:srgbClr val="202122"/>
+                </a:solidFill>
+                <a:effectLst/>
+                <a:latin typeface="Vazir"/>
+              </a:rPr>
+              <a:t>In </a:t>
+            </a:r>
+            <a:r>
+              <a:rPr lang="en-US" b="0" i="0" u="none" strike="noStrike" dirty="0">
+                <a:solidFill>
+                  <a:srgbClr val="0B0080"/>
+                </a:solidFill>
+                <a:effectLst/>
+                <a:latin typeface="Vazir"/>
+                <a:hlinkClick r:id="rId3" tooltip="Computer programming"/>
+              </a:rPr>
+              <a:t>computer programming</a:t>
+            </a:r>
+            <a:r>
+              <a:rPr lang="en-US" b="0" i="0" dirty="0">
+                <a:solidFill>
+                  <a:srgbClr val="202122"/>
+                </a:solidFill>
+                <a:effectLst/>
+                <a:latin typeface="Vazir"/>
+              </a:rPr>
+              <a:t>, </a:t>
+            </a:r>
+            <a:r>
+              <a:rPr lang="en-US" b="1" i="0" dirty="0">
+                <a:solidFill>
+                  <a:srgbClr val="202122"/>
+                </a:solidFill>
+                <a:effectLst/>
+                <a:latin typeface="Vazir"/>
+              </a:rPr>
+              <a:t>green threads</a:t>
+            </a:r>
+            <a:r>
+              <a:rPr lang="en-US" b="0" i="0" dirty="0">
+                <a:solidFill>
+                  <a:srgbClr val="202122"/>
+                </a:solidFill>
+                <a:effectLst/>
+                <a:latin typeface="Vazir"/>
+              </a:rPr>
+              <a:t> are </a:t>
+            </a:r>
+            <a:r>
+              <a:rPr lang="en-US" b="0" i="0" u="none" strike="noStrike" dirty="0">
+                <a:solidFill>
+                  <a:srgbClr val="0B0080"/>
+                </a:solidFill>
+                <a:effectLst/>
+                <a:latin typeface="Vazir"/>
+                <a:hlinkClick r:id="rId4" tooltip="Thread (computing)"/>
+              </a:rPr>
+              <a:t>threads</a:t>
+            </a:r>
+            <a:r>
+              <a:rPr lang="en-US" b="0" i="0" dirty="0">
+                <a:solidFill>
+                  <a:srgbClr val="202122"/>
+                </a:solidFill>
+                <a:effectLst/>
+                <a:latin typeface="Vazir"/>
+              </a:rPr>
+              <a:t> that are scheduled by a </a:t>
+            </a:r>
+            <a:r>
+              <a:rPr lang="en-US" b="0" i="0" u="none" strike="noStrike" dirty="0">
+                <a:solidFill>
+                  <a:srgbClr val="0B0080"/>
+                </a:solidFill>
+                <a:effectLst/>
+                <a:latin typeface="Vazir"/>
+                <a:hlinkClick r:id="rId5" tooltip="Runtime library"/>
+              </a:rPr>
+              <a:t>runtime library</a:t>
+            </a:r>
+            <a:r>
+              <a:rPr lang="en-US" b="0" i="0" dirty="0">
+                <a:solidFill>
+                  <a:srgbClr val="202122"/>
+                </a:solidFill>
+                <a:effectLst/>
+                <a:latin typeface="Vazir"/>
+              </a:rPr>
+              <a:t> or </a:t>
+            </a:r>
+            <a:r>
+              <a:rPr lang="en-US" b="0" i="0" u="none" strike="noStrike" dirty="0">
+                <a:solidFill>
+                  <a:srgbClr val="0B0080"/>
+                </a:solidFill>
+                <a:effectLst/>
+                <a:latin typeface="Vazir"/>
+                <a:hlinkClick r:id="rId6" tooltip="Virtual machine"/>
+              </a:rPr>
+              <a:t>virtual machine</a:t>
+            </a:r>
+            <a:r>
+              <a:rPr lang="en-US" b="0" i="0" dirty="0">
+                <a:solidFill>
+                  <a:srgbClr val="202122"/>
+                </a:solidFill>
+                <a:effectLst/>
+                <a:latin typeface="Vazir"/>
+              </a:rPr>
+              <a:t> (VM) instead of natively by the underlying </a:t>
+            </a:r>
+            <a:r>
+              <a:rPr lang="en-US" b="0" i="0" u="none" strike="noStrike" dirty="0">
+                <a:solidFill>
+                  <a:srgbClr val="0B0080"/>
+                </a:solidFill>
+                <a:effectLst/>
+                <a:latin typeface="Vazir"/>
+                <a:hlinkClick r:id="rId7" tooltip="Operating system"/>
+              </a:rPr>
+              <a:t>operating system</a:t>
+            </a:r>
+            <a:r>
+              <a:rPr lang="en-US" b="0" i="0" dirty="0">
+                <a:solidFill>
+                  <a:srgbClr val="202122"/>
+                </a:solidFill>
+                <a:effectLst/>
+                <a:latin typeface="Vazir"/>
+              </a:rPr>
+              <a:t> (OS). Green threads emulate multithreaded environments without relying on any native OS abilities, and they are managed in </a:t>
+            </a:r>
+            <a:r>
+              <a:rPr lang="en-US" b="0" i="0" u="none" strike="noStrike" dirty="0">
+                <a:solidFill>
+                  <a:srgbClr val="0B0080"/>
+                </a:solidFill>
+                <a:effectLst/>
+                <a:latin typeface="Vazir"/>
+                <a:hlinkClick r:id="rId8" tooltip="User space"/>
+              </a:rPr>
+              <a:t>user space</a:t>
+            </a:r>
+            <a:r>
+              <a:rPr lang="en-US" b="0" i="0" dirty="0">
+                <a:solidFill>
+                  <a:srgbClr val="202122"/>
+                </a:solidFill>
+                <a:effectLst/>
+                <a:latin typeface="Vazir"/>
+              </a:rPr>
+              <a:t> instead of </a:t>
+            </a:r>
+            <a:r>
+              <a:rPr lang="en-US" b="0" i="0" u="none" strike="noStrike" dirty="0">
+                <a:solidFill>
+                  <a:srgbClr val="0B0080"/>
+                </a:solidFill>
+                <a:effectLst/>
+                <a:latin typeface="Vazir"/>
+                <a:hlinkClick r:id="rId9" tooltip="Kernel (operating system)"/>
+              </a:rPr>
+              <a:t>kernel</a:t>
+            </a:r>
+            <a:r>
+              <a:rPr lang="en-US" b="0" i="0" dirty="0">
+                <a:solidFill>
+                  <a:srgbClr val="202122"/>
+                </a:solidFill>
+                <a:effectLst/>
+                <a:latin typeface="Vazir"/>
+              </a:rPr>
+              <a:t> space, enabling them to work in environments that do not have native thread support.</a:t>
+            </a:r>
+            <a:r>
+              <a:rPr lang="en-US" b="0" i="0" u="none" strike="noStrike" baseline="30000" dirty="0">
+                <a:solidFill>
+                  <a:srgbClr val="0B0080"/>
+                </a:solidFill>
+                <a:effectLst/>
+                <a:latin typeface="Vazir"/>
+                <a:hlinkClick r:id="rId10"/>
+              </a:rPr>
+              <a:t>[1]</a:t>
+            </a:r>
+            <a:endParaRPr lang="en-US" b="0" i="0" dirty="0">
+              <a:solidFill>
+                <a:srgbClr val="202122"/>
+              </a:solidFill>
+              <a:effectLst/>
+              <a:latin typeface="Vazir"/>
+            </a:endParaRPr>
+          </a:p>
+          <a:p>
+            <a:br>
+              <a:rPr lang="en-US" dirty="0"/>
+            </a:br>
+            <a:r>
+              <a:rPr lang="en-US" dirty="0"/>
+              <a:t>and take a look at this Question: https://softwareengineering.stackexchange.com/questions/222642/are-go-langs-goroutine-pools-just-green-threads</a:t>
+            </a:r>
+          </a:p>
+        </p:txBody>
+      </p:sp>
+      <p:sp>
+        <p:nvSpPr>
+          <p:cNvPr id="4" name="Slide Number Placeholder 3"/>
+          <p:cNvSpPr>
+            <a:spLocks noGrp="1"/>
+          </p:cNvSpPr>
+          <p:nvPr>
+            <p:ph type="sldNum" sz="quarter" idx="5"/>
+          </p:nvPr>
+        </p:nvSpPr>
+        <p:spPr/>
+        <p:txBody>
+          <a:bodyPr/>
+          <a:lstStyle/>
+          <a:p>
+            <a:fld id="{D0E944BF-F28C-48F8-90D3-273132DB8999}" type="slidenum">
+              <a:rPr lang="fa-IR" smtClean="0"/>
+              <a:t>19</a:t>
+            </a:fld>
+            <a:endParaRPr lang="fa-IR"/>
+          </a:p>
+        </p:txBody>
+      </p:sp>
+    </p:spTree>
+    <p:extLst>
+      <p:ext uri="{BB962C8B-B14F-4D97-AF65-F5344CB8AC3E}">
+        <p14:creationId xmlns:p14="http://schemas.microsoft.com/office/powerpoint/2010/main" val="806786308"/>
+      </p:ext>
+    </p:extLst>
+  </p:cSld>
+  <p:clrMapOvr>
+    <a:masterClrMapping/>
+  </p:clrMapOvr>
+</p:notes>
+</file>
+
+<file path=ppt/notesSlides/notesSlide12.xml><?xml version="1.0" encoding="utf-8"?>
+<p:notes xmlns:a="http://schemas.openxmlformats.org/drawingml/2006/main" xmlns:r="http://schemas.openxmlformats.org/officeDocument/2006/relationships" xmlns:p="http://schemas.openxmlformats.org/presentationml/2006/main">
+  <p:cSld>
+    <p:spTree>
+      <p:nvGrpSpPr>
+        <p:cNvPr id="1" name=""/>
+        <p:cNvGrpSpPr/>
+        <p:nvPr/>
+      </p:nvGrpSpPr>
+      <p:grpSpPr>
+        <a:xfrm>
+          <a:off x="0" y="0"/>
+          <a:ext cx="0" cy="0"/>
+          <a:chOff x="0" y="0"/>
+          <a:chExt cx="0" cy="0"/>
+        </a:xfrm>
+      </p:grpSpPr>
+      <p:sp>
+        <p:nvSpPr>
+          <p:cNvPr id="2" name="Slide Image Placeholder 1"/>
+          <p:cNvSpPr>
+            <a:spLocks noGrp="1" noRot="1" noChangeAspect="1"/>
+          </p:cNvSpPr>
+          <p:nvPr>
+            <p:ph type="sldImg"/>
+          </p:nvPr>
+        </p:nvSpPr>
+        <p:spPr/>
+      </p:sp>
+      <p:sp>
+        <p:nvSpPr>
+          <p:cNvPr id="3" name="Notes Placeholder 2"/>
+          <p:cNvSpPr>
+            <a:spLocks noGrp="1"/>
+          </p:cNvSpPr>
+          <p:nvPr>
+            <p:ph type="body" idx="1"/>
+          </p:nvPr>
+        </p:nvSpPr>
+        <p:spPr/>
+        <p:txBody>
+          <a:bodyPr/>
+          <a:lstStyle/>
+          <a:p>
+            <a:r>
+              <a:rPr lang="en-US" dirty="0"/>
+              <a:t>* When a </a:t>
+            </a:r>
+            <a:r>
+              <a:rPr lang="en-US" dirty="0" err="1"/>
+              <a:t>groutine</a:t>
+            </a:r>
+            <a:r>
+              <a:rPr lang="en-US" dirty="0"/>
+              <a:t> has no end it cause your application to crash by consuming all the memory.</a:t>
+            </a:r>
+            <a:endParaRPr lang="fa-IR" dirty="0"/>
+          </a:p>
+        </p:txBody>
+      </p:sp>
+      <p:sp>
+        <p:nvSpPr>
+          <p:cNvPr id="4" name="Slide Number Placeholder 3"/>
+          <p:cNvSpPr>
+            <a:spLocks noGrp="1"/>
+          </p:cNvSpPr>
+          <p:nvPr>
+            <p:ph type="sldNum" sz="quarter" idx="5"/>
+          </p:nvPr>
+        </p:nvSpPr>
+        <p:spPr/>
+        <p:txBody>
+          <a:bodyPr/>
+          <a:lstStyle/>
+          <a:p>
+            <a:fld id="{D0E944BF-F28C-48F8-90D3-273132DB8999}" type="slidenum">
+              <a:rPr lang="fa-IR" smtClean="0"/>
+              <a:t>20</a:t>
+            </a:fld>
+            <a:endParaRPr lang="fa-IR"/>
+          </a:p>
+        </p:txBody>
+      </p:sp>
+    </p:spTree>
+    <p:extLst>
+      <p:ext uri="{BB962C8B-B14F-4D97-AF65-F5344CB8AC3E}">
+        <p14:creationId xmlns:p14="http://schemas.microsoft.com/office/powerpoint/2010/main" val="1888753326"/>
+      </p:ext>
+    </p:extLst>
+  </p:cSld>
+  <p:clrMapOvr>
+    <a:masterClrMapping/>
+  </p:clrMapOvr>
+</p:notes>
+</file>
+
+<file path=ppt/notesSlides/notesSlide13.xml><?xml version="1.0" encoding="utf-8"?>
+<p:notes xmlns:a="http://schemas.openxmlformats.org/drawingml/2006/main" xmlns:r="http://schemas.openxmlformats.org/officeDocument/2006/relationships" xmlns:p="http://schemas.openxmlformats.org/presentationml/2006/main">
+  <p:cSld>
+    <p:spTree>
+      <p:nvGrpSpPr>
+        <p:cNvPr id="1" name=""/>
+        <p:cNvGrpSpPr/>
+        <p:nvPr/>
+      </p:nvGrpSpPr>
+      <p:grpSpPr>
+        <a:xfrm>
+          <a:off x="0" y="0"/>
+          <a:ext cx="0" cy="0"/>
+          <a:chOff x="0" y="0"/>
+          <a:chExt cx="0" cy="0"/>
+        </a:xfrm>
+      </p:grpSpPr>
+      <p:sp>
+        <p:nvSpPr>
+          <p:cNvPr id="2" name="Slide Image Placeholder 1"/>
+          <p:cNvSpPr>
+            <a:spLocks noGrp="1" noRot="1" noChangeAspect="1"/>
+          </p:cNvSpPr>
+          <p:nvPr>
+            <p:ph type="sldImg"/>
+          </p:nvPr>
+        </p:nvSpPr>
+        <p:spPr/>
+      </p:sp>
+      <p:sp>
+        <p:nvSpPr>
+          <p:cNvPr id="3" name="Notes Placeholder 2"/>
+          <p:cNvSpPr>
+            <a:spLocks noGrp="1"/>
+          </p:cNvSpPr>
+          <p:nvPr>
+            <p:ph type="body" idx="1"/>
+          </p:nvPr>
+        </p:nvSpPr>
+        <p:spPr/>
+        <p:txBody>
+          <a:bodyPr/>
+          <a:lstStyle/>
+          <a:p>
+            <a:pPr marL="171450" indent="-171450">
+              <a:buFont typeface="Arial" panose="020B0604020202020204" pitchFamily="34" charset="0"/>
+              <a:buChar char="•"/>
+            </a:pPr>
+            <a:r>
+              <a:rPr lang="en-US" dirty="0"/>
+              <a:t>Channels are created with built-in make function</a:t>
+            </a:r>
+          </a:p>
+          <a:p>
+            <a:pPr marL="628650" lvl="1" indent="-171450">
+              <a:buFont typeface="Arial" panose="020B0604020202020204" pitchFamily="34" charset="0"/>
+              <a:buChar char="•"/>
+            </a:pPr>
+            <a:r>
+              <a:rPr lang="en-US" dirty="0"/>
+              <a:t>Some internal </a:t>
+            </a:r>
+            <a:r>
+              <a:rPr lang="en-US" dirty="0" err="1"/>
+              <a:t>behaviours</a:t>
+            </a:r>
+            <a:r>
+              <a:rPr lang="en-US" dirty="0"/>
+              <a:t> must be set up, so it is the best way to use the make function to create a channel.</a:t>
+            </a:r>
+          </a:p>
+          <a:p>
+            <a:pPr marL="171450" lvl="0" indent="-171450">
+              <a:buFont typeface="Arial" panose="020B0604020202020204" pitchFamily="34" charset="0"/>
+              <a:buChar char="•"/>
+            </a:pPr>
+            <a:r>
+              <a:rPr lang="en-US" dirty="0"/>
+              <a:t>When we pass a type into a channel, then it only accept int (channels are strongly typed)</a:t>
+            </a:r>
+          </a:p>
+          <a:p>
+            <a:pPr marL="171450" lvl="0" indent="-171450">
+              <a:buFont typeface="Arial" panose="020B0604020202020204" pitchFamily="34" charset="0"/>
+              <a:buChar char="•"/>
+            </a:pPr>
+            <a:r>
+              <a:rPr lang="en-US" dirty="0"/>
+              <a:t>Channels are unbuffered by default</a:t>
+            </a:r>
+          </a:p>
+          <a:p>
+            <a:pPr marL="171450" lvl="0" indent="-171450">
+              <a:buFont typeface="Arial" panose="020B0604020202020204" pitchFamily="34" charset="0"/>
+              <a:buChar char="•"/>
+            </a:pPr>
+            <a:r>
+              <a:rPr lang="en-US" dirty="0"/>
+              <a:t>When a message has been sent to a channel, the code flow is hang up until the message has been received by the </a:t>
+            </a:r>
+            <a:r>
+              <a:rPr lang="en-US" dirty="0" err="1"/>
+              <a:t>chaneel</a:t>
+            </a:r>
+            <a:r>
+              <a:rPr lang="en-US" dirty="0"/>
+              <a:t> in the another go routine.</a:t>
+            </a:r>
+          </a:p>
+          <a:p>
+            <a:pPr marL="171450" lvl="0" indent="-171450">
+              <a:buFont typeface="Arial" panose="020B0604020202020204" pitchFamily="34" charset="0"/>
+              <a:buChar char="•"/>
+            </a:pPr>
+            <a:endParaRPr lang="en-US" dirty="0"/>
+          </a:p>
+        </p:txBody>
+      </p:sp>
+      <p:sp>
+        <p:nvSpPr>
+          <p:cNvPr id="4" name="Slide Number Placeholder 3"/>
+          <p:cNvSpPr>
+            <a:spLocks noGrp="1"/>
+          </p:cNvSpPr>
+          <p:nvPr>
+            <p:ph type="sldNum" sz="quarter" idx="5"/>
+          </p:nvPr>
+        </p:nvSpPr>
+        <p:spPr/>
+        <p:txBody>
+          <a:bodyPr/>
+          <a:lstStyle/>
+          <a:p>
+            <a:fld id="{D0E944BF-F28C-48F8-90D3-273132DB8999}" type="slidenum">
+              <a:rPr lang="fa-IR" smtClean="0"/>
+              <a:t>22</a:t>
+            </a:fld>
+            <a:endParaRPr lang="fa-IR"/>
+          </a:p>
+        </p:txBody>
+      </p:sp>
+    </p:spTree>
+    <p:extLst>
+      <p:ext uri="{BB962C8B-B14F-4D97-AF65-F5344CB8AC3E}">
+        <p14:creationId xmlns:p14="http://schemas.microsoft.com/office/powerpoint/2010/main" val="361321364"/>
+      </p:ext>
+    </p:extLst>
+  </p:cSld>
+  <p:clrMapOvr>
+    <a:masterClrMapping/>
+  </p:clrMapOvr>
+</p:notes>
+</file>
+
+<file path=ppt/notesSlides/notesSlide14.xml><?xml version="1.0" encoding="utf-8"?>
+<p:notes xmlns:a="http://schemas.openxmlformats.org/drawingml/2006/main" xmlns:r="http://schemas.openxmlformats.org/officeDocument/2006/relationships" xmlns:p="http://schemas.openxmlformats.org/presentationml/2006/main">
+  <p:cSld>
+    <p:spTree>
+      <p:nvGrpSpPr>
+        <p:cNvPr id="1" name=""/>
+        <p:cNvGrpSpPr/>
+        <p:nvPr/>
+      </p:nvGrpSpPr>
+      <p:grpSpPr>
+        <a:xfrm>
+          <a:off x="0" y="0"/>
+          <a:ext cx="0" cy="0"/>
+          <a:chOff x="0" y="0"/>
+          <a:chExt cx="0" cy="0"/>
+        </a:xfrm>
+      </p:grpSpPr>
+      <p:sp>
+        <p:nvSpPr>
+          <p:cNvPr id="2" name="Slide Image Placeholder 1"/>
+          <p:cNvSpPr>
+            <a:spLocks noGrp="1" noRot="1" noChangeAspect="1"/>
+          </p:cNvSpPr>
+          <p:nvPr>
+            <p:ph type="sldImg"/>
+          </p:nvPr>
+        </p:nvSpPr>
+        <p:spPr/>
+      </p:sp>
+      <p:sp>
+        <p:nvSpPr>
+          <p:cNvPr id="3" name="Notes Placeholder 2"/>
+          <p:cNvSpPr>
+            <a:spLocks noGrp="1"/>
+          </p:cNvSpPr>
+          <p:nvPr>
+            <p:ph type="body" idx="1"/>
+          </p:nvPr>
+        </p:nvSpPr>
+        <p:spPr/>
+        <p:txBody>
+          <a:bodyPr/>
+          <a:lstStyle/>
+          <a:p>
+            <a:pPr marL="171450" indent="-171450">
+              <a:buFont typeface="Arial" panose="020B0604020202020204" pitchFamily="34" charset="0"/>
+              <a:buChar char="•"/>
+            </a:pPr>
+            <a:r>
+              <a:rPr lang="en-US" dirty="0"/>
+              <a:t>The implementation of the channel flow has an implicit polymorphic </a:t>
+            </a:r>
+            <a:r>
+              <a:rPr lang="en-US" dirty="0" err="1"/>
+              <a:t>behaviour</a:t>
+            </a:r>
+            <a:r>
+              <a:rPr lang="en-US" dirty="0"/>
+              <a:t> (we send </a:t>
+            </a:r>
+            <a:r>
+              <a:rPr lang="en-US" dirty="0" err="1"/>
+              <a:t>channeld</a:t>
+            </a:r>
+            <a:r>
+              <a:rPr lang="en-US" dirty="0"/>
+              <a:t> to both the send-only and receiver-only functions), It cast the bidirectional channel to a single direct channel.</a:t>
+            </a:r>
+          </a:p>
+          <a:p>
+            <a:pPr marL="171450" indent="-171450">
+              <a:buFont typeface="Arial" panose="020B0604020202020204" pitchFamily="34" charset="0"/>
+              <a:buChar char="•"/>
+            </a:pPr>
+            <a:endParaRPr lang="fa-IR" dirty="0"/>
+          </a:p>
+        </p:txBody>
+      </p:sp>
+      <p:sp>
+        <p:nvSpPr>
+          <p:cNvPr id="4" name="Slide Number Placeholder 3"/>
+          <p:cNvSpPr>
+            <a:spLocks noGrp="1"/>
+          </p:cNvSpPr>
+          <p:nvPr>
+            <p:ph type="sldNum" sz="quarter" idx="5"/>
+          </p:nvPr>
+        </p:nvSpPr>
+        <p:spPr/>
+        <p:txBody>
+          <a:bodyPr/>
+          <a:lstStyle/>
+          <a:p>
+            <a:fld id="{D0E944BF-F28C-48F8-90D3-273132DB8999}" type="slidenum">
+              <a:rPr lang="fa-IR" smtClean="0"/>
+              <a:t>23</a:t>
+            </a:fld>
+            <a:endParaRPr lang="fa-IR"/>
+          </a:p>
+        </p:txBody>
+      </p:sp>
+    </p:spTree>
+    <p:extLst>
+      <p:ext uri="{BB962C8B-B14F-4D97-AF65-F5344CB8AC3E}">
+        <p14:creationId xmlns:p14="http://schemas.microsoft.com/office/powerpoint/2010/main" val="996696559"/>
+      </p:ext>
+    </p:extLst>
+  </p:cSld>
+  <p:clrMapOvr>
+    <a:masterClrMapping/>
+  </p:clrMapOvr>
+</p:notes>
+</file>
+
+<file path=ppt/notesSlides/notesSlide15.xml><?xml version="1.0" encoding="utf-8"?>
+<p:notes xmlns:a="http://schemas.openxmlformats.org/drawingml/2006/main" xmlns:r="http://schemas.openxmlformats.org/officeDocument/2006/relationships" xmlns:p="http://schemas.openxmlformats.org/presentationml/2006/main">
+  <p:cSld>
+    <p:spTree>
+      <p:nvGrpSpPr>
+        <p:cNvPr id="1" name=""/>
+        <p:cNvGrpSpPr/>
+        <p:nvPr/>
+      </p:nvGrpSpPr>
+      <p:grpSpPr>
+        <a:xfrm>
+          <a:off x="0" y="0"/>
+          <a:ext cx="0" cy="0"/>
+          <a:chOff x="0" y="0"/>
+          <a:chExt cx="0" cy="0"/>
+        </a:xfrm>
+      </p:grpSpPr>
+      <p:sp>
+        <p:nvSpPr>
+          <p:cNvPr id="2" name="Slide Image Placeholder 1"/>
+          <p:cNvSpPr>
+            <a:spLocks noGrp="1" noRot="1" noChangeAspect="1"/>
+          </p:cNvSpPr>
+          <p:nvPr>
+            <p:ph type="sldImg"/>
+          </p:nvPr>
+        </p:nvSpPr>
+        <p:spPr/>
+      </p:sp>
+      <p:sp>
+        <p:nvSpPr>
+          <p:cNvPr id="3" name="Notes Placeholder 2"/>
+          <p:cNvSpPr>
+            <a:spLocks noGrp="1"/>
+          </p:cNvSpPr>
+          <p:nvPr>
+            <p:ph type="body" idx="1"/>
+          </p:nvPr>
+        </p:nvSpPr>
+        <p:spPr/>
+        <p:txBody>
+          <a:bodyPr/>
+          <a:lstStyle/>
+          <a:p>
+            <a:pPr marL="171450" indent="-171450">
+              <a:buFont typeface="Arial" panose="020B0604020202020204" pitchFamily="34" charset="0"/>
+              <a:buChar char="•"/>
+            </a:pPr>
+            <a:r>
+              <a:rPr lang="en-US" dirty="0"/>
+              <a:t>The problem can be understand better if we show that some data must be missing if we don’t receive properly.</a:t>
+            </a:r>
+          </a:p>
+          <a:p>
+            <a:pPr marL="628650" lvl="1" indent="-171450">
+              <a:buFont typeface="Arial" panose="020B0604020202020204" pitchFamily="34" charset="0"/>
+              <a:buChar char="•"/>
+            </a:pPr>
+            <a:r>
+              <a:rPr lang="en-US" dirty="0"/>
+              <a:t>The frequency of sending and receiving must be same.</a:t>
+            </a:r>
+          </a:p>
+          <a:p>
+            <a:pPr marL="171450" lvl="0" indent="-171450">
+              <a:buFont typeface="Arial" panose="020B0604020202020204" pitchFamily="34" charset="0"/>
+              <a:buChar char="•"/>
+            </a:pPr>
+            <a:r>
+              <a:rPr lang="en-US" dirty="0"/>
+              <a:t>The buffered channels are very good when the receiver or sender needs more data to process the task they must do and we don’t want to block the other side.</a:t>
+            </a:r>
+            <a:endParaRPr lang="fa-IR" dirty="0"/>
+          </a:p>
+        </p:txBody>
+      </p:sp>
+      <p:sp>
+        <p:nvSpPr>
+          <p:cNvPr id="4" name="Slide Number Placeholder 3"/>
+          <p:cNvSpPr>
+            <a:spLocks noGrp="1"/>
+          </p:cNvSpPr>
+          <p:nvPr>
+            <p:ph type="sldNum" sz="quarter" idx="5"/>
+          </p:nvPr>
+        </p:nvSpPr>
+        <p:spPr/>
+        <p:txBody>
+          <a:bodyPr/>
+          <a:lstStyle/>
+          <a:p>
+            <a:fld id="{D0E944BF-F28C-48F8-90D3-273132DB8999}" type="slidenum">
+              <a:rPr lang="fa-IR" smtClean="0"/>
+              <a:t>24</a:t>
+            </a:fld>
+            <a:endParaRPr lang="fa-IR"/>
+          </a:p>
+        </p:txBody>
+      </p:sp>
+    </p:spTree>
+    <p:extLst>
+      <p:ext uri="{BB962C8B-B14F-4D97-AF65-F5344CB8AC3E}">
+        <p14:creationId xmlns:p14="http://schemas.microsoft.com/office/powerpoint/2010/main" val="2252263412"/>
+      </p:ext>
+    </p:extLst>
+  </p:cSld>
+  <p:clrMapOvr>
+    <a:masterClrMapping/>
+  </p:clrMapOvr>
+</p:notes>
+</file>
+
+<file path=ppt/notesSlides/notesSlide16.xml><?xml version="1.0" encoding="utf-8"?>
+<p:notes xmlns:a="http://schemas.openxmlformats.org/drawingml/2006/main" xmlns:r="http://schemas.openxmlformats.org/officeDocument/2006/relationships" xmlns:p="http://schemas.openxmlformats.org/presentationml/2006/main">
+  <p:cSld>
+    <p:spTree>
+      <p:nvGrpSpPr>
+        <p:cNvPr id="1" name=""/>
+        <p:cNvGrpSpPr/>
+        <p:nvPr/>
+      </p:nvGrpSpPr>
+      <p:grpSpPr>
+        <a:xfrm>
+          <a:off x="0" y="0"/>
+          <a:ext cx="0" cy="0"/>
+          <a:chOff x="0" y="0"/>
+          <a:chExt cx="0" cy="0"/>
+        </a:xfrm>
+      </p:grpSpPr>
+      <p:sp>
+        <p:nvSpPr>
+          <p:cNvPr id="2" name="Slide Image Placeholder 1"/>
+          <p:cNvSpPr>
+            <a:spLocks noGrp="1" noRot="1" noChangeAspect="1"/>
+          </p:cNvSpPr>
+          <p:nvPr>
+            <p:ph type="sldImg"/>
+          </p:nvPr>
+        </p:nvSpPr>
+        <p:spPr/>
+      </p:sp>
+      <p:sp>
+        <p:nvSpPr>
+          <p:cNvPr id="3" name="Notes Placeholder 2"/>
+          <p:cNvSpPr>
+            <a:spLocks noGrp="1"/>
+          </p:cNvSpPr>
+          <p:nvPr>
+            <p:ph type="body" idx="1"/>
+          </p:nvPr>
+        </p:nvSpPr>
+        <p:spPr/>
+        <p:txBody>
+          <a:bodyPr/>
+          <a:lstStyle/>
+          <a:p>
+            <a:pPr marL="171450" indent="-171450">
+              <a:buFont typeface="Arial" panose="020B0604020202020204" pitchFamily="34" charset="0"/>
+              <a:buChar char="•"/>
+            </a:pPr>
+            <a:r>
+              <a:rPr lang="en-US" dirty="0"/>
+              <a:t>We have to close the channel when we are no sending data.</a:t>
+            </a:r>
+          </a:p>
+          <a:p>
+            <a:pPr marL="628650" lvl="1" indent="-171450">
+              <a:buFont typeface="Arial" panose="020B0604020202020204" pitchFamily="34" charset="0"/>
+              <a:buChar char="•"/>
+            </a:pPr>
+            <a:r>
+              <a:rPr lang="en-US" dirty="0"/>
+              <a:t>After closing the channel we can’t send any more channels</a:t>
+            </a:r>
+          </a:p>
+          <a:p>
+            <a:pPr marL="628650" lvl="1" indent="-171450">
+              <a:buFont typeface="Arial" panose="020B0604020202020204" pitchFamily="34" charset="0"/>
+              <a:buChar char="•"/>
+            </a:pPr>
+            <a:r>
+              <a:rPr lang="en-US" dirty="0"/>
+              <a:t>You can’t reopen a closed channel, so be very careful when you close a channel (even you can’t find out is a channel closed or not)</a:t>
+            </a:r>
+            <a:endParaRPr lang="fa-IR" dirty="0"/>
+          </a:p>
+          <a:p>
+            <a:pPr marL="628650" lvl="1" indent="-171450">
+              <a:buFont typeface="Arial" panose="020B0604020202020204" pitchFamily="34" charset="0"/>
+              <a:buChar char="•"/>
+            </a:pPr>
+            <a:r>
+              <a:rPr lang="en-US" dirty="0"/>
+              <a:t>In the receiver side we can use the , </a:t>
+            </a:r>
+            <a:r>
+              <a:rPr lang="en-US"/>
+              <a:t>ok syntax </a:t>
+            </a:r>
+            <a:r>
+              <a:rPr lang="en-US" dirty="0"/>
+              <a:t>to find out if the channel is closed or not. Test with a forever loop.</a:t>
+            </a:r>
+          </a:p>
+          <a:p>
+            <a:pPr marL="1085850" lvl="2" indent="-171450">
+              <a:buFont typeface="Arial" panose="020B0604020202020204" pitchFamily="34" charset="0"/>
+              <a:buChar char="•"/>
+            </a:pPr>
+            <a:r>
+              <a:rPr lang="en-US" dirty="0"/>
+              <a:t>We can use this syntax when we can’t use for range.</a:t>
+            </a:r>
+          </a:p>
+          <a:p>
+            <a:pPr marL="1543050" lvl="3" indent="-171450">
+              <a:buFont typeface="Arial" panose="020B0604020202020204" pitchFamily="34" charset="0"/>
+              <a:buChar char="•"/>
+            </a:pPr>
+            <a:r>
+              <a:rPr lang="en-US" dirty="0"/>
+              <a:t>Test it with the log example.</a:t>
+            </a:r>
+          </a:p>
+          <a:p>
+            <a:pPr marL="628650" lvl="1" indent="-171450">
+              <a:buFont typeface="Arial" panose="020B0604020202020204" pitchFamily="34" charset="0"/>
+              <a:buChar char="•"/>
+            </a:pPr>
+            <a:r>
+              <a:rPr lang="en-US" dirty="0"/>
+              <a:t>Struct {} is zero memory allocation, and a channel with this data is signal only channel.</a:t>
+            </a:r>
+          </a:p>
+          <a:p>
+            <a:pPr marL="628650" lvl="1" indent="-171450">
+              <a:buFont typeface="Arial" panose="020B0604020202020204" pitchFamily="34" charset="0"/>
+              <a:buChar char="•"/>
+            </a:pPr>
+            <a:r>
+              <a:rPr lang="en-US" dirty="0"/>
+              <a:t>Think more about the default in select.</a:t>
+            </a:r>
+            <a:endParaRPr lang="fa-IR" dirty="0"/>
+          </a:p>
+        </p:txBody>
+      </p:sp>
+      <p:sp>
+        <p:nvSpPr>
+          <p:cNvPr id="4" name="Slide Number Placeholder 3"/>
+          <p:cNvSpPr>
+            <a:spLocks noGrp="1"/>
+          </p:cNvSpPr>
+          <p:nvPr>
+            <p:ph type="sldNum" sz="quarter" idx="5"/>
+          </p:nvPr>
+        </p:nvSpPr>
+        <p:spPr/>
+        <p:txBody>
+          <a:bodyPr/>
+          <a:lstStyle/>
+          <a:p>
+            <a:fld id="{D0E944BF-F28C-48F8-90D3-273132DB8999}" type="slidenum">
+              <a:rPr lang="fa-IR" smtClean="0"/>
+              <a:t>25</a:t>
+            </a:fld>
+            <a:endParaRPr lang="fa-IR"/>
+          </a:p>
+        </p:txBody>
+      </p:sp>
+    </p:spTree>
+    <p:extLst>
+      <p:ext uri="{BB962C8B-B14F-4D97-AF65-F5344CB8AC3E}">
+        <p14:creationId xmlns:p14="http://schemas.microsoft.com/office/powerpoint/2010/main" val="920051198"/>
       </p:ext>
     </p:extLst>
   </p:cSld>
@@ -2010,7 +3039,7 @@
           <a:p>
             <a:fld id="{EA0C0817-A112-4847-8014-A94B7D2A4EA3}" type="datetime1">
               <a:rPr lang="en-US" smtClean="0"/>
-              <a:t>10/22/2020</a:t>
+              <a:t>11/5/2020</a:t>
             </a:fld>
             <a:endParaRPr lang="en-US" dirty="0"/>
           </a:p>
@@ -2231,7 +3260,7 @@
           <a:p>
             <a:fld id="{7332B432-ACDA-4023-A761-2BAB76577B62}" type="datetime1">
               <a:rPr lang="en-US" smtClean="0"/>
-              <a:t>10/22/2020</a:t>
+              <a:t>11/5/2020</a:t>
             </a:fld>
             <a:endParaRPr lang="en-US" dirty="0"/>
           </a:p>
@@ -2830,7 +3859,7 @@
           <a:p>
             <a:fld id="{D9C646AA-F36E-4540-911D-FFFC0A0EF24A}" type="datetime1">
               <a:rPr lang="en-US" smtClean="0"/>
-              <a:t>10/22/2020</a:t>
+              <a:t>11/5/2020</a:t>
             </a:fld>
             <a:endParaRPr lang="en-US" dirty="0"/>
           </a:p>
@@ -3150,7 +4179,7 @@
           <a:p>
             <a:fld id="{69186D26-FA5F-4637-B602-B7C2DC34CFD4}" type="datetime1">
               <a:rPr lang="en-US" smtClean="0"/>
-              <a:t>10/22/2020</a:t>
+              <a:t>11/5/2020</a:t>
             </a:fld>
             <a:endParaRPr lang="en-US" dirty="0"/>
           </a:p>
@@ -3587,7 +4616,7 @@
           <a:p>
             <a:fld id="{8A7F15D8-96D1-4781-BC50-CA8A088B2FE4}" type="datetime1">
               <a:rPr lang="en-US" smtClean="0"/>
-              <a:t>10/22/2020</a:t>
+              <a:t>11/5/2020</a:t>
             </a:fld>
             <a:endParaRPr lang="en-US" dirty="0"/>
           </a:p>
@@ -3705,7 +4734,7 @@
           <a:p>
             <a:fld id="{F9A96C99-B8F8-4528-BD05-0E16E943DC09}" type="datetime1">
               <a:rPr lang="en-US" smtClean="0"/>
-              <a:t>10/22/2020</a:t>
+              <a:t>11/5/2020</a:t>
             </a:fld>
             <a:endParaRPr lang="en-US" dirty="0"/>
           </a:p>
@@ -3800,7 +4829,7 @@
           <a:p>
             <a:fld id="{03636942-C211-4B28-8DBD-C953E00AF71B}" type="datetime1">
               <a:rPr lang="en-US" smtClean="0"/>
-              <a:t>10/22/2020</a:t>
+              <a:t>11/5/2020</a:t>
             </a:fld>
             <a:endParaRPr lang="en-US" dirty="0"/>
           </a:p>
@@ -4217,7 +5246,7 @@
           <a:p>
             <a:fld id="{7E8D12A6-918A-48BD-8CB9-CA713993B0EA}" type="datetime1">
               <a:rPr lang="en-US" smtClean="0"/>
-              <a:t>10/22/2020</a:t>
+              <a:t>11/5/2020</a:t>
             </a:fld>
             <a:endParaRPr lang="en-US" dirty="0"/>
           </a:p>
@@ -4479,7 +5508,7 @@
             <a:fld id="{E778CE86-875F-4587-BCF6-FA054AFC0D53}" type="datetime1">
               <a:rPr lang="en-US" smtClean="0"/>
               <a:pPr/>
-              <a:t>10/22/2020</a:t>
+              <a:t>11/5/2020</a:t>
             </a:fld>
             <a:endParaRPr lang="en-US" dirty="0"/>
           </a:p>
@@ -4995,7 +6024,7 @@
           <a:p>
             <a:fld id="{F6FA2B21-3FCD-4721-B95C-427943F61125}" type="datetime1">
               <a:rPr lang="en-US" smtClean="0"/>
-              <a:t>10/22/2020</a:t>
+              <a:t>11/5/2020</a:t>
             </a:fld>
             <a:endParaRPr lang="en-US" dirty="0"/>
           </a:p>
@@ -7356,12 +8385,20 @@
               <a:t>Use </a:t>
             </a:r>
             <a:r>
-              <a:rPr lang="en-US" dirty="0" err="1"/>
+              <a:rPr lang="en-US" dirty="0" err="1">
+                <a:latin typeface="Consolas" panose="020B0609020204030204" pitchFamily="49" charset="0"/>
+              </a:rPr>
               <a:t>sync.WaitGroup</a:t>
             </a:r>
             <a:r>
-              <a:rPr lang="en-US" dirty="0"/>
-              <a:t> to wait for groups of goroutines to complete</a:t>
+              <a:rPr lang="en-US" dirty="0">
+                <a:latin typeface="Consolas" panose="020B0609020204030204" pitchFamily="49" charset="0"/>
+              </a:rPr>
+              <a:t> </a:t>
+            </a:r>
+            <a:r>
+              <a:rPr lang="en-US" dirty="0"/>
+              <a:t>to wait for groups of goroutines to complete</a:t>
             </a:r>
           </a:p>
           <a:p>
@@ -7371,20 +8408,36 @@
               <a:t>Use </a:t>
             </a:r>
             <a:r>
-              <a:rPr lang="en-US" dirty="0" err="1"/>
+              <a:rPr lang="en-US" dirty="0" err="1">
+                <a:latin typeface="Consolas" panose="020B0609020204030204" pitchFamily="49" charset="0"/>
+              </a:rPr>
               <a:t>sync.Mutex</a:t>
             </a:r>
             <a:r>
-              <a:rPr lang="en-US" dirty="0"/>
-              <a:t> and </a:t>
-            </a:r>
-            <a:r>
-              <a:rPr lang="en-US" dirty="0" err="1"/>
+              <a:rPr lang="en-US" dirty="0">
+                <a:latin typeface="Consolas" panose="020B0609020204030204" pitchFamily="49" charset="0"/>
+              </a:rPr>
+              <a:t> </a:t>
+            </a:r>
+            <a:r>
+              <a:rPr lang="en-US" dirty="0"/>
+              <a:t>and </a:t>
+            </a:r>
+            <a:r>
+              <a:rPr lang="en-US" dirty="0" err="1">
+                <a:latin typeface="Consolas" panose="020B0609020204030204" pitchFamily="49" charset="0"/>
+              </a:rPr>
               <a:t>sync.RWMutex</a:t>
             </a:r>
             <a:r>
-              <a:rPr lang="en-US" dirty="0"/>
-              <a:t> to protect data access.</a:t>
+              <a:rPr lang="en-US" dirty="0">
+                <a:latin typeface="Consolas" panose="020B0609020204030204" pitchFamily="49" charset="0"/>
+              </a:rPr>
+              <a:t> </a:t>
+            </a:r>
+            <a:r>
+              <a:rPr lang="en-US" dirty="0"/>
+              <a:t>to protect data access.</a:t>
             </a:r>
           </a:p>
           <a:p>
@@ -7407,10 +8460,14 @@
               <a:t>Change with </a:t>
             </a:r>
             <a:r>
-              <a:rPr lang="en-US" dirty="0" err="1"/>
+              <a:rPr lang="en-US" dirty="0" err="1">
+                <a:latin typeface="Consolas" panose="020B0609020204030204" pitchFamily="49" charset="0"/>
+              </a:rPr>
               <a:t>runtime.GOMAXPROCS</a:t>
             </a:r>
-            <a:endParaRPr lang="en-US" dirty="0"/>
+            <a:endParaRPr lang="en-US" dirty="0">
+              <a:latin typeface="Consolas" panose="020B0609020204030204" pitchFamily="49" charset="0"/>
+            </a:endParaRPr>
           </a:p>
           <a:p>
             <a:pPr lvl="1"/>
@@ -7699,7 +8756,37 @@
               <a:rPr lang="en-US" dirty="0"/>
               <a:t>Check for race conditions at compile time.</a:t>
             </a:r>
-            <a:endParaRPr lang="fa-IR" dirty="0"/>
+          </a:p>
+          <a:p>
+            <a:pPr lvl="2"/>
+            <a:r>
+              <a:rPr lang="en-US" dirty="0"/>
+              <a:t>By using –race option in go switches</a:t>
+            </a:r>
+          </a:p>
+          <a:p>
+            <a:pPr lvl="3"/>
+            <a:r>
+              <a:rPr lang="en-US">
+                <a:latin typeface="Consolas" panose="020B0609020204030204" pitchFamily="49" charset="0"/>
+              </a:rPr>
+              <a:t>&gt; go </a:t>
+            </a:r>
+            <a:r>
+              <a:rPr lang="en-US" dirty="0">
+                <a:latin typeface="Consolas" panose="020B0609020204030204" pitchFamily="49" charset="0"/>
+              </a:rPr>
+              <a:t>run –race </a:t>
+            </a:r>
+            <a:r>
+              <a:rPr lang="en-US" dirty="0" err="1">
+                <a:latin typeface="Consolas" panose="020B0609020204030204" pitchFamily="49" charset="0"/>
+              </a:rPr>
+              <a:t>main.go</a:t>
+            </a:r>
+            <a:endParaRPr lang="fa-IR" dirty="0">
+              <a:latin typeface="Consolas" panose="020B0609020204030204" pitchFamily="49" charset="0"/>
+            </a:endParaRPr>
           </a:p>
         </p:txBody>
       </p:sp>
@@ -7918,15 +9005,21 @@
           <a:p>
             <a:pPr lvl="2"/>
             <a:r>
-              <a:rPr lang="en-US" dirty="0"/>
+              <a:rPr lang="en-US" sz="1300" dirty="0">
+                <a:latin typeface="Consolas" panose="020B0609020204030204" pitchFamily="49" charset="0"/>
+              </a:rPr>
               <a:t>make(</a:t>
             </a:r>
             <a:r>
-              <a:rPr lang="en-US" dirty="0" err="1"/>
+              <a:rPr lang="en-US" sz="1300" dirty="0" err="1">
+                <a:latin typeface="Consolas" panose="020B0609020204030204" pitchFamily="49" charset="0"/>
+              </a:rPr>
               <a:t>chann</a:t>
             </a:r>
             <a:r>
-              <a:rPr lang="en-US" dirty="0"/>
+              <a:rPr lang="en-US" sz="1300" dirty="0">
+                <a:latin typeface="Consolas" panose="020B0609020204030204" pitchFamily="49" charset="0"/>
+              </a:rPr>
               <a:t> int)</a:t>
             </a:r>
           </a:p>
@@ -7940,18 +9033,26 @@
           <a:p>
             <a:pPr lvl="2"/>
             <a:r>
-              <a:rPr lang="en-US" dirty="0" err="1"/>
+              <a:rPr lang="en-US" sz="1300" dirty="0" err="1">
+                <a:latin typeface="Consolas" panose="020B0609020204030204" pitchFamily="49" charset="0"/>
+              </a:rPr>
               <a:t>ch</a:t>
             </a:r>
             <a:r>
-              <a:rPr lang="en-US" dirty="0"/>
+              <a:rPr lang="en-US" sz="1300" dirty="0">
+                <a:latin typeface="Consolas" panose="020B0609020204030204" pitchFamily="49" charset="0"/>
+              </a:rPr>
               <a:t> &lt;- </a:t>
             </a:r>
             <a:r>
-              <a:rPr lang="en-US" dirty="0" err="1"/>
+              <a:rPr lang="en-US" sz="1300" dirty="0" err="1">
+                <a:latin typeface="Consolas" panose="020B0609020204030204" pitchFamily="49" charset="0"/>
+              </a:rPr>
               <a:t>val</a:t>
             </a:r>
-            <a:endParaRPr lang="en-US" dirty="0"/>
+            <a:endParaRPr lang="en-US" sz="1300" dirty="0">
+              <a:latin typeface="Consolas" panose="020B0609020204030204" pitchFamily="49" charset="0"/>
+            </a:endParaRPr>
           </a:p>
           <a:p>
             <a:pPr lvl="1"/>
@@ -7963,18 +9064,26 @@
           <a:p>
             <a:pPr lvl="2"/>
             <a:r>
-              <a:rPr lang="en-US" dirty="0" err="1"/>
+              <a:rPr lang="en-US" sz="1300" dirty="0" err="1">
+                <a:latin typeface="Consolas" panose="020B0609020204030204" pitchFamily="49" charset="0"/>
+              </a:rPr>
               <a:t>val</a:t>
             </a:r>
             <a:r>
-              <a:rPr lang="en-US" dirty="0"/>
+              <a:rPr lang="en-US" sz="1300" dirty="0">
+                <a:latin typeface="Consolas" panose="020B0609020204030204" pitchFamily="49" charset="0"/>
+              </a:rPr>
               <a:t> := &lt;-</a:t>
             </a:r>
             <a:r>
-              <a:rPr lang="en-US" dirty="0" err="1"/>
+              <a:rPr lang="en-US" sz="1300" dirty="0" err="1">
+                <a:latin typeface="Consolas" panose="020B0609020204030204" pitchFamily="49" charset="0"/>
+              </a:rPr>
               <a:t>ch</a:t>
             </a:r>
-            <a:endParaRPr lang="en-US" dirty="0"/>
+            <a:endParaRPr lang="en-US" sz="1300" dirty="0">
+              <a:latin typeface="Consolas" panose="020B0609020204030204" pitchFamily="49" charset="0"/>
+            </a:endParaRPr>
           </a:p>
           <a:p>
             <a:pPr lvl="1"/>
@@ -8085,14 +9194,18 @@
             <a:pPr lvl="2"/>
             <a:r>
               <a:rPr lang="en-US" dirty="0"/>
-              <a:t>Sed-only: </a:t>
-            </a:r>
-            <a:r>
-              <a:rPr lang="en-US" dirty="0" err="1"/>
+              <a:t>Send-only: </a:t>
+            </a:r>
+            <a:r>
+              <a:rPr lang="en-US" sz="1300" dirty="0" err="1">
+                <a:latin typeface="Consolas" panose="020B0609020204030204" pitchFamily="49" charset="0"/>
+              </a:rPr>
               <a:t>chan</a:t>
             </a:r>
             <a:r>
-              <a:rPr lang="en-US" dirty="0"/>
+              <a:rPr lang="en-US" sz="1300" dirty="0">
+                <a:latin typeface="Consolas" panose="020B0609020204030204" pitchFamily="49" charset="0"/>
+              </a:rPr>
               <a:t> &lt;- int</a:t>
             </a:r>
           </a:p>
@@ -8100,14 +9213,24 @@
             <a:pPr lvl="2"/>
             <a:r>
               <a:rPr lang="en-US" dirty="0"/>
-              <a:t>Receive-only: &lt;-</a:t>
-            </a:r>
-            <a:r>
-              <a:rPr lang="en-US" dirty="0" err="1"/>
+              <a:t>Receive-only: </a:t>
+            </a:r>
+            <a:r>
+              <a:rPr lang="en-US" sz="1300" dirty="0">
+                <a:latin typeface="Consolas" panose="020B0609020204030204" pitchFamily="49" charset="0"/>
+              </a:rPr>
+              <a:t>&lt;-</a:t>
+            </a:r>
+            <a:r>
+              <a:rPr lang="en-US" sz="1300" dirty="0" err="1">
+                <a:latin typeface="Consolas" panose="020B0609020204030204" pitchFamily="49" charset="0"/>
+              </a:rPr>
               <a:t>chan</a:t>
             </a:r>
             <a:r>
-              <a:rPr lang="en-US" dirty="0"/>
+              <a:rPr lang="en-US" sz="1300" dirty="0">
+                <a:latin typeface="Consolas" panose="020B0609020204030204" pitchFamily="49" charset="0"/>
+              </a:rPr>
               <a:t> int</a:t>
             </a:r>
           </a:p>
@@ -8226,15 +9349,21 @@
           <a:p>
             <a:pPr lvl="2"/>
             <a:r>
-              <a:rPr lang="en-US" dirty="0"/>
+              <a:rPr lang="en-US" sz="1300" dirty="0">
+                <a:latin typeface="Consolas" panose="020B0609020204030204" pitchFamily="49" charset="0"/>
+              </a:rPr>
               <a:t>make(</a:t>
             </a:r>
             <a:r>
-              <a:rPr lang="en-US" dirty="0" err="1"/>
+              <a:rPr lang="en-US" sz="1300" dirty="0" err="1">
+                <a:latin typeface="Consolas" panose="020B0609020204030204" pitchFamily="49" charset="0"/>
+              </a:rPr>
               <a:t>chan</a:t>
             </a:r>
             <a:r>
-              <a:rPr lang="en-US" dirty="0"/>
+              <a:rPr lang="en-US" sz="1300" dirty="0">
+                <a:latin typeface="Consolas" panose="020B0609020204030204" pitchFamily="49" charset="0"/>
+              </a:rPr>
               <a:t> int, 50)</a:t>
             </a:r>
           </a:p>
@@ -10095,12 +11224,12 @@
 </file>
 
 <file path=customXml/item1.xml><?xml version="1.0" encoding="utf-8"?>
-<?mso-contentType ?>
-<FormTemplates xmlns="http://schemas.microsoft.com/sharepoint/v3/contenttype/forms">
-  <Display>DocumentLibraryForm</Display>
-  <Edit>DocumentLibraryForm</Edit>
-  <New>DocumentLibraryForm</New>
-</FormTemplates>
+<p:properties xmlns:p="http://schemas.microsoft.com/office/2006/metadata/properties" xmlns:xsi="http://www.w3.org/2001/XMLSchema-instance" xmlns:pc="http://schemas.microsoft.com/office/infopath/2007/PartnerControls">
+  <documentManagement>
+    <Status xmlns="71af3243-3dd4-4a8d-8c0d-dd76da1f02a5">Not started</Status>
+    <MediaServiceKeyPoints xmlns="71af3243-3dd4-4a8d-8c0d-dd76da1f02a5" xsi:nil="true"/>
+  </documentManagement>
+</p:properties>
 </file>
 
 <file path=customXml/item2.xml><?xml version="1.0" encoding="utf-8"?>
@@ -10325,18 +11454,20 @@
 </file>
 
 <file path=customXml/item3.xml><?xml version="1.0" encoding="utf-8"?>
-<p:properties xmlns:p="http://schemas.microsoft.com/office/2006/metadata/properties" xmlns:xsi="http://www.w3.org/2001/XMLSchema-instance" xmlns:pc="http://schemas.microsoft.com/office/infopath/2007/PartnerControls">
-  <documentManagement>
-    <Status xmlns="71af3243-3dd4-4a8d-8c0d-dd76da1f02a5">Not started</Status>
-    <MediaServiceKeyPoints xmlns="71af3243-3dd4-4a8d-8c0d-dd76da1f02a5" xsi:nil="true"/>
-  </documentManagement>
-</p:properties>
+<?mso-contentType ?>
+<FormTemplates xmlns="http://schemas.microsoft.com/sharepoint/v3/contenttype/forms">
+  <Display>DocumentLibraryForm</Display>
+  <Edit>DocumentLibraryForm</Edit>
+  <New>DocumentLibraryForm</New>
+</FormTemplates>
 </file>
 
 <file path=customXml/itemProps1.xml><?xml version="1.0" encoding="utf-8"?>
-<ds:datastoreItem xmlns:ds="http://schemas.openxmlformats.org/officeDocument/2006/customXml" ds:itemID="{7745B92C-4D89-4324-B52D-E1F5F627B790}">
+<ds:datastoreItem xmlns:ds="http://schemas.openxmlformats.org/officeDocument/2006/customXml" ds:itemID="{E7228C0C-F774-4270-99CB-314B07EBFBE7}">
   <ds:schemaRefs>
-    <ds:schemaRef ds:uri="http://schemas.microsoft.com/sharepoint/v3/contenttype/forms"/>
+    <ds:schemaRef ds:uri="http://schemas.microsoft.com/office/2006/metadata/properties"/>
+    <ds:schemaRef ds:uri="http://schemas.microsoft.com/office/infopath/2007/PartnerControls"/>
+    <ds:schemaRef ds:uri="71af3243-3dd4-4a8d-8c0d-dd76da1f02a5"/>
   </ds:schemaRefs>
 </ds:datastoreItem>
 </file>
@@ -10361,11 +11492,9 @@
 </file>
 
 <file path=customXml/itemProps3.xml><?xml version="1.0" encoding="utf-8"?>
-<ds:datastoreItem xmlns:ds="http://schemas.openxmlformats.org/officeDocument/2006/customXml" ds:itemID="{E7228C0C-F774-4270-99CB-314B07EBFBE7}">
+<ds:datastoreItem xmlns:ds="http://schemas.openxmlformats.org/officeDocument/2006/customXml" ds:itemID="{7745B92C-4D89-4324-B52D-E1F5F627B790}">
   <ds:schemaRefs>
-    <ds:schemaRef ds:uri="http://schemas.microsoft.com/office/2006/metadata/properties"/>
-    <ds:schemaRef ds:uri="http://schemas.microsoft.com/office/infopath/2007/PartnerControls"/>
-    <ds:schemaRef ds:uri="71af3243-3dd4-4a8d-8c0d-dd76da1f02a5"/>
+    <ds:schemaRef ds:uri="http://schemas.microsoft.com/sharepoint/v3/contenttype/forms"/>
   </ds:schemaRefs>
 </ds:datastoreItem>
 </file>
</xml_diff>